<commit_message>
Updating build section following release 1.0.3
</commit_message>
<xml_diff>
--- a/_posts/201912_asa_alm101/asa_alm_schemas.pptx
+++ b/_posts/201912_asa_alm101/asa_alm_schemas.pptx
@@ -14,6 +14,7 @@
     <p:sldId id="259" r:id="rId8"/>
     <p:sldId id="262" r:id="rId9"/>
     <p:sldId id="264" r:id="rId10"/>
+    <p:sldId id="265" r:id="rId11"/>
   </p:sldIdLst>
   <p:sldSz cx="12192000" cy="6858000"/>
   <p:notesSz cx="6858000" cy="9144000"/>
@@ -267,7 +268,7 @@
           <a:p>
             <a:fld id="{EFE3DC24-D59A-4959-A2E7-76F4E9EDD6B7}" type="datetimeFigureOut">
               <a:rPr lang="en-US" smtClean="0"/>
-              <a:t>3/2/2020</a:t>
+              <a:t>3/31/2020</a:t>
             </a:fld>
             <a:endParaRPr lang="en-US"/>
           </a:p>
@@ -465,7 +466,7 @@
           <a:p>
             <a:fld id="{EFE3DC24-D59A-4959-A2E7-76F4E9EDD6B7}" type="datetimeFigureOut">
               <a:rPr lang="en-US" smtClean="0"/>
-              <a:t>3/2/2020</a:t>
+              <a:t>3/31/2020</a:t>
             </a:fld>
             <a:endParaRPr lang="en-US"/>
           </a:p>
@@ -673,7 +674,7 @@
           <a:p>
             <a:fld id="{EFE3DC24-D59A-4959-A2E7-76F4E9EDD6B7}" type="datetimeFigureOut">
               <a:rPr lang="en-US" smtClean="0"/>
-              <a:t>3/2/2020</a:t>
+              <a:t>3/31/2020</a:t>
             </a:fld>
             <a:endParaRPr lang="en-US"/>
           </a:p>
@@ -871,7 +872,7 @@
           <a:p>
             <a:fld id="{EFE3DC24-D59A-4959-A2E7-76F4E9EDD6B7}" type="datetimeFigureOut">
               <a:rPr lang="en-US" smtClean="0"/>
-              <a:t>3/2/2020</a:t>
+              <a:t>3/31/2020</a:t>
             </a:fld>
             <a:endParaRPr lang="en-US"/>
           </a:p>
@@ -1146,7 +1147,7 @@
           <a:p>
             <a:fld id="{EFE3DC24-D59A-4959-A2E7-76F4E9EDD6B7}" type="datetimeFigureOut">
               <a:rPr lang="en-US" smtClean="0"/>
-              <a:t>3/2/2020</a:t>
+              <a:t>3/31/2020</a:t>
             </a:fld>
             <a:endParaRPr lang="en-US"/>
           </a:p>
@@ -1411,7 +1412,7 @@
           <a:p>
             <a:fld id="{EFE3DC24-D59A-4959-A2E7-76F4E9EDD6B7}" type="datetimeFigureOut">
               <a:rPr lang="en-US" smtClean="0"/>
-              <a:t>3/2/2020</a:t>
+              <a:t>3/31/2020</a:t>
             </a:fld>
             <a:endParaRPr lang="en-US"/>
           </a:p>
@@ -1823,7 +1824,7 @@
           <a:p>
             <a:fld id="{EFE3DC24-D59A-4959-A2E7-76F4E9EDD6B7}" type="datetimeFigureOut">
               <a:rPr lang="en-US" smtClean="0"/>
-              <a:t>3/2/2020</a:t>
+              <a:t>3/31/2020</a:t>
             </a:fld>
             <a:endParaRPr lang="en-US"/>
           </a:p>
@@ -1964,7 +1965,7 @@
           <a:p>
             <a:fld id="{EFE3DC24-D59A-4959-A2E7-76F4E9EDD6B7}" type="datetimeFigureOut">
               <a:rPr lang="en-US" smtClean="0"/>
-              <a:t>3/2/2020</a:t>
+              <a:t>3/31/2020</a:t>
             </a:fld>
             <a:endParaRPr lang="en-US"/>
           </a:p>
@@ -2077,7 +2078,7 @@
           <a:p>
             <a:fld id="{EFE3DC24-D59A-4959-A2E7-76F4E9EDD6B7}" type="datetimeFigureOut">
               <a:rPr lang="en-US" smtClean="0"/>
-              <a:t>3/2/2020</a:t>
+              <a:t>3/31/2020</a:t>
             </a:fld>
             <a:endParaRPr lang="en-US"/>
           </a:p>
@@ -2388,7 +2389,7 @@
           <a:p>
             <a:fld id="{EFE3DC24-D59A-4959-A2E7-76F4E9EDD6B7}" type="datetimeFigureOut">
               <a:rPr lang="en-US" smtClean="0"/>
-              <a:t>3/2/2020</a:t>
+              <a:t>3/31/2020</a:t>
             </a:fld>
             <a:endParaRPr lang="en-US"/>
           </a:p>
@@ -2676,7 +2677,7 @@
           <a:p>
             <a:fld id="{EFE3DC24-D59A-4959-A2E7-76F4E9EDD6B7}" type="datetimeFigureOut">
               <a:rPr lang="en-US" smtClean="0"/>
-              <a:t>3/2/2020</a:t>
+              <a:t>3/31/2020</a:t>
             </a:fld>
             <a:endParaRPr lang="en-US"/>
           </a:p>
@@ -2917,7 +2918,7 @@
           <a:p>
             <a:fld id="{EFE3DC24-D59A-4959-A2E7-76F4E9EDD6B7}" type="datetimeFigureOut">
               <a:rPr lang="en-US" smtClean="0"/>
-              <a:t>3/2/2020</a:t>
+              <a:t>3/31/2020</a:t>
             </a:fld>
             <a:endParaRPr lang="en-US"/>
           </a:p>
@@ -3397,6 +3398,683 @@
 </p:sld>
 </file>
 
+<file path=ppt/slides/slide10.xml><?xml version="1.0" encoding="utf-8"?>
+<p:sld xmlns:a="http://schemas.openxmlformats.org/drawingml/2006/main" xmlns:r="http://schemas.openxmlformats.org/officeDocument/2006/relationships" xmlns:p="http://schemas.openxmlformats.org/presentationml/2006/main">
+  <p:cSld>
+    <p:spTree>
+      <p:nvGrpSpPr>
+        <p:cNvPr id="1" name=""/>
+        <p:cNvGrpSpPr/>
+        <p:nvPr/>
+      </p:nvGrpSpPr>
+      <p:grpSpPr>
+        <a:xfrm>
+          <a:off x="0" y="0"/>
+          <a:ext cx="0" cy="0"/>
+          <a:chOff x="0" y="0"/>
+          <a:chExt cx="0" cy="0"/>
+        </a:xfrm>
+      </p:grpSpPr>
+      <p:pic>
+        <p:nvPicPr>
+          <p:cNvPr id="2" name="Picture 1">
+            <a:extLst>
+              <a:ext uri="{FF2B5EF4-FFF2-40B4-BE49-F238E27FC236}">
+                <a16:creationId xmlns:a16="http://schemas.microsoft.com/office/drawing/2014/main" id="{7C8E8469-5D8A-437A-8A66-BE90C5B9A53F}"/>
+              </a:ext>
+            </a:extLst>
+          </p:cNvPr>
+          <p:cNvPicPr>
+            <a:picLocks noChangeAspect="1"/>
+          </p:cNvPicPr>
+          <p:nvPr/>
+        </p:nvPicPr>
+        <p:blipFill>
+          <a:blip r:embed="rId2"/>
+          <a:stretch>
+            <a:fillRect/>
+          </a:stretch>
+        </p:blipFill>
+        <p:spPr>
+          <a:xfrm>
+            <a:off x="7092306" y="2046816"/>
+            <a:ext cx="5032400" cy="1695001"/>
+          </a:xfrm>
+          <a:prstGeom prst="rect">
+            <a:avLst/>
+          </a:prstGeom>
+        </p:spPr>
+      </p:pic>
+      <p:pic>
+        <p:nvPicPr>
+          <p:cNvPr id="4" name="Picture 3">
+            <a:extLst>
+              <a:ext uri="{FF2B5EF4-FFF2-40B4-BE49-F238E27FC236}">
+                <a16:creationId xmlns:a16="http://schemas.microsoft.com/office/drawing/2014/main" id="{F89A6322-5049-4AFC-B4EA-9E49FF89AFF3}"/>
+              </a:ext>
+            </a:extLst>
+          </p:cNvPr>
+          <p:cNvPicPr>
+            <a:picLocks noChangeAspect="1"/>
+          </p:cNvPicPr>
+          <p:nvPr/>
+        </p:nvPicPr>
+        <p:blipFill rotWithShape="1">
+          <a:blip r:embed="rId3"/>
+          <a:srcRect t="10521" r="4302"/>
+          <a:stretch/>
+        </p:blipFill>
+        <p:spPr>
+          <a:xfrm>
+            <a:off x="131794" y="2369182"/>
+            <a:ext cx="5338564" cy="2874152"/>
+          </a:xfrm>
+          <a:prstGeom prst="rect">
+            <a:avLst/>
+          </a:prstGeom>
+        </p:spPr>
+      </p:pic>
+      <p:sp>
+        <p:nvSpPr>
+          <p:cNvPr id="6" name="Rectangle 5">
+            <a:extLst>
+              <a:ext uri="{FF2B5EF4-FFF2-40B4-BE49-F238E27FC236}">
+                <a16:creationId xmlns:a16="http://schemas.microsoft.com/office/drawing/2014/main" id="{FF037C7A-A9F3-445A-B82C-2C5F6B7CBF3C}"/>
+              </a:ext>
+            </a:extLst>
+          </p:cNvPr>
+          <p:cNvSpPr/>
+          <p:nvPr/>
+        </p:nvSpPr>
+        <p:spPr>
+          <a:xfrm>
+            <a:off x="243906" y="4956028"/>
+            <a:ext cx="1894114" cy="169425"/>
+          </a:xfrm>
+          <a:prstGeom prst="rect">
+            <a:avLst/>
+          </a:prstGeom>
+          <a:solidFill>
+            <a:srgbClr val="4472C4">
+              <a:alpha val="20000"/>
+            </a:srgbClr>
+          </a:solidFill>
+          <a:ln>
+            <a:solidFill>
+              <a:schemeClr val="accent1"/>
+            </a:solidFill>
+          </a:ln>
+        </p:spPr>
+        <p:style>
+          <a:lnRef idx="0">
+            <a:scrgbClr r="0" g="0" b="0"/>
+          </a:lnRef>
+          <a:fillRef idx="0">
+            <a:scrgbClr r="0" g="0" b="0"/>
+          </a:fillRef>
+          <a:effectRef idx="0">
+            <a:scrgbClr r="0" g="0" b="0"/>
+          </a:effectRef>
+          <a:fontRef idx="minor">
+            <a:schemeClr val="lt1"/>
+          </a:fontRef>
+        </p:style>
+        <p:txBody>
+          <a:bodyPr rtlCol="0" anchor="ctr"/>
+          <a:lstStyle/>
+          <a:p>
+            <a:pPr algn="ctr"/>
+            <a:endParaRPr lang="en-US"/>
+          </a:p>
+        </p:txBody>
+      </p:sp>
+      <p:sp>
+        <p:nvSpPr>
+          <p:cNvPr id="7" name="Rectangle 6">
+            <a:extLst>
+              <a:ext uri="{FF2B5EF4-FFF2-40B4-BE49-F238E27FC236}">
+                <a16:creationId xmlns:a16="http://schemas.microsoft.com/office/drawing/2014/main" id="{50E6031A-5A09-4690-B23E-F91F0124C7DD}"/>
+              </a:ext>
+            </a:extLst>
+          </p:cNvPr>
+          <p:cNvSpPr/>
+          <p:nvPr/>
+        </p:nvSpPr>
+        <p:spPr>
+          <a:xfrm>
+            <a:off x="243906" y="4130842"/>
+            <a:ext cx="1894114" cy="585537"/>
+          </a:xfrm>
+          <a:prstGeom prst="rect">
+            <a:avLst/>
+          </a:prstGeom>
+          <a:solidFill>
+            <a:srgbClr val="4472C4">
+              <a:alpha val="20000"/>
+            </a:srgbClr>
+          </a:solidFill>
+          <a:ln>
+            <a:solidFill>
+              <a:schemeClr val="accent1"/>
+            </a:solidFill>
+          </a:ln>
+        </p:spPr>
+        <p:style>
+          <a:lnRef idx="0">
+            <a:scrgbClr r="0" g="0" b="0"/>
+          </a:lnRef>
+          <a:fillRef idx="0">
+            <a:scrgbClr r="0" g="0" b="0"/>
+          </a:fillRef>
+          <a:effectRef idx="0">
+            <a:scrgbClr r="0" g="0" b="0"/>
+          </a:effectRef>
+          <a:fontRef idx="minor">
+            <a:schemeClr val="lt1"/>
+          </a:fontRef>
+        </p:style>
+        <p:txBody>
+          <a:bodyPr rtlCol="0" anchor="ctr"/>
+          <a:lstStyle/>
+          <a:p>
+            <a:pPr algn="ctr"/>
+            <a:endParaRPr lang="en-US"/>
+          </a:p>
+        </p:txBody>
+      </p:sp>
+      <p:sp>
+        <p:nvSpPr>
+          <p:cNvPr id="8" name="Rectangle 7">
+            <a:extLst>
+              <a:ext uri="{FF2B5EF4-FFF2-40B4-BE49-F238E27FC236}">
+                <a16:creationId xmlns:a16="http://schemas.microsoft.com/office/drawing/2014/main" id="{015BCF18-3969-4ED4-A10F-232DF6D0FE20}"/>
+              </a:ext>
+            </a:extLst>
+          </p:cNvPr>
+          <p:cNvSpPr/>
+          <p:nvPr/>
+        </p:nvSpPr>
+        <p:spPr>
+          <a:xfrm>
+            <a:off x="243906" y="3144254"/>
+            <a:ext cx="1894114" cy="746940"/>
+          </a:xfrm>
+          <a:prstGeom prst="rect">
+            <a:avLst/>
+          </a:prstGeom>
+          <a:solidFill>
+            <a:srgbClr val="4472C4">
+              <a:alpha val="20000"/>
+            </a:srgbClr>
+          </a:solidFill>
+          <a:ln>
+            <a:solidFill>
+              <a:schemeClr val="accent1"/>
+            </a:solidFill>
+          </a:ln>
+        </p:spPr>
+        <p:style>
+          <a:lnRef idx="0">
+            <a:scrgbClr r="0" g="0" b="0"/>
+          </a:lnRef>
+          <a:fillRef idx="0">
+            <a:scrgbClr r="0" g="0" b="0"/>
+          </a:fillRef>
+          <a:effectRef idx="0">
+            <a:scrgbClr r="0" g="0" b="0"/>
+          </a:effectRef>
+          <a:fontRef idx="minor">
+            <a:schemeClr val="lt1"/>
+          </a:fontRef>
+        </p:style>
+        <p:txBody>
+          <a:bodyPr rtlCol="0" anchor="ctr"/>
+          <a:lstStyle/>
+          <a:p>
+            <a:pPr algn="ctr"/>
+            <a:endParaRPr lang="en-US"/>
+          </a:p>
+        </p:txBody>
+      </p:sp>
+      <p:sp>
+        <p:nvSpPr>
+          <p:cNvPr id="9" name="Rectangle 8">
+            <a:extLst>
+              <a:ext uri="{FF2B5EF4-FFF2-40B4-BE49-F238E27FC236}">
+                <a16:creationId xmlns:a16="http://schemas.microsoft.com/office/drawing/2014/main" id="{365A9EAB-EBAB-4AD8-89A3-4750B24E142D}"/>
+              </a:ext>
+            </a:extLst>
+          </p:cNvPr>
+          <p:cNvSpPr/>
+          <p:nvPr/>
+        </p:nvSpPr>
+        <p:spPr>
+          <a:xfrm>
+            <a:off x="7246283" y="2843463"/>
+            <a:ext cx="1894114" cy="204537"/>
+          </a:xfrm>
+          <a:prstGeom prst="rect">
+            <a:avLst/>
+          </a:prstGeom>
+          <a:solidFill>
+            <a:srgbClr val="4472C4">
+              <a:alpha val="20000"/>
+            </a:srgbClr>
+          </a:solidFill>
+          <a:ln>
+            <a:solidFill>
+              <a:schemeClr val="accent1"/>
+            </a:solidFill>
+          </a:ln>
+        </p:spPr>
+        <p:style>
+          <a:lnRef idx="0">
+            <a:scrgbClr r="0" g="0" b="0"/>
+          </a:lnRef>
+          <a:fillRef idx="0">
+            <a:scrgbClr r="0" g="0" b="0"/>
+          </a:fillRef>
+          <a:effectRef idx="0">
+            <a:scrgbClr r="0" g="0" b="0"/>
+          </a:effectRef>
+          <a:fontRef idx="minor">
+            <a:schemeClr val="lt1"/>
+          </a:fontRef>
+        </p:style>
+        <p:txBody>
+          <a:bodyPr rtlCol="0" anchor="ctr"/>
+          <a:lstStyle/>
+          <a:p>
+            <a:pPr algn="ctr"/>
+            <a:endParaRPr lang="en-US"/>
+          </a:p>
+        </p:txBody>
+      </p:sp>
+      <p:cxnSp>
+        <p:nvCxnSpPr>
+          <p:cNvPr id="10" name="Connector: Elbow 9">
+            <a:extLst>
+              <a:ext uri="{FF2B5EF4-FFF2-40B4-BE49-F238E27FC236}">
+                <a16:creationId xmlns:a16="http://schemas.microsoft.com/office/drawing/2014/main" id="{7651325D-915B-411C-835A-5F972437C4ED}"/>
+              </a:ext>
+            </a:extLst>
+          </p:cNvPr>
+          <p:cNvCxnSpPr>
+            <a:stCxn id="8" idx="3"/>
+            <a:endCxn id="9" idx="1"/>
+          </p:cNvCxnSpPr>
+          <p:nvPr/>
+        </p:nvCxnSpPr>
+        <p:spPr>
+          <a:xfrm flipV="1">
+            <a:off x="2138020" y="2945732"/>
+            <a:ext cx="5108263" cy="571992"/>
+          </a:xfrm>
+          <a:prstGeom prst="bentConnector3">
+            <a:avLst>
+              <a:gd name="adj1" fmla="val 66738"/>
+            </a:avLst>
+          </a:prstGeom>
+          <a:ln>
+            <a:tailEnd type="triangle"/>
+          </a:ln>
+        </p:spPr>
+        <p:style>
+          <a:lnRef idx="1">
+            <a:schemeClr val="accent1"/>
+          </a:lnRef>
+          <a:fillRef idx="0">
+            <a:schemeClr val="accent1"/>
+          </a:fillRef>
+          <a:effectRef idx="0">
+            <a:schemeClr val="accent1"/>
+          </a:effectRef>
+          <a:fontRef idx="minor">
+            <a:schemeClr val="tx1"/>
+          </a:fontRef>
+        </p:style>
+      </p:cxnSp>
+      <p:cxnSp>
+        <p:nvCxnSpPr>
+          <p:cNvPr id="11" name="Connector: Elbow 10">
+            <a:extLst>
+              <a:ext uri="{FF2B5EF4-FFF2-40B4-BE49-F238E27FC236}">
+                <a16:creationId xmlns:a16="http://schemas.microsoft.com/office/drawing/2014/main" id="{A6ACE253-86FB-431E-B312-E36564DF7A43}"/>
+              </a:ext>
+            </a:extLst>
+          </p:cNvPr>
+          <p:cNvCxnSpPr>
+            <a:stCxn id="7" idx="3"/>
+          </p:cNvCxnSpPr>
+          <p:nvPr/>
+        </p:nvCxnSpPr>
+        <p:spPr>
+          <a:xfrm flipV="1">
+            <a:off x="2138020" y="2932187"/>
+            <a:ext cx="5108264" cy="1491424"/>
+          </a:xfrm>
+          <a:prstGeom prst="bentConnector3">
+            <a:avLst>
+              <a:gd name="adj1" fmla="val 70727"/>
+            </a:avLst>
+          </a:prstGeom>
+          <a:ln>
+            <a:tailEnd type="triangle"/>
+          </a:ln>
+        </p:spPr>
+        <p:style>
+          <a:lnRef idx="1">
+            <a:schemeClr val="accent1"/>
+          </a:lnRef>
+          <a:fillRef idx="0">
+            <a:schemeClr val="accent1"/>
+          </a:fillRef>
+          <a:effectRef idx="0">
+            <a:schemeClr val="accent1"/>
+          </a:effectRef>
+          <a:fontRef idx="minor">
+            <a:schemeClr val="tx1"/>
+          </a:fontRef>
+        </p:style>
+      </p:cxnSp>
+      <p:cxnSp>
+        <p:nvCxnSpPr>
+          <p:cNvPr id="12" name="Connector: Elbow 11">
+            <a:extLst>
+              <a:ext uri="{FF2B5EF4-FFF2-40B4-BE49-F238E27FC236}">
+                <a16:creationId xmlns:a16="http://schemas.microsoft.com/office/drawing/2014/main" id="{250A1905-1EB2-465B-8984-2307C9866B57}"/>
+              </a:ext>
+            </a:extLst>
+          </p:cNvPr>
+          <p:cNvCxnSpPr>
+            <a:endCxn id="9" idx="1"/>
+          </p:cNvCxnSpPr>
+          <p:nvPr/>
+        </p:nvCxnSpPr>
+        <p:spPr>
+          <a:xfrm flipV="1">
+            <a:off x="2138020" y="2945732"/>
+            <a:ext cx="5108263" cy="2123574"/>
+          </a:xfrm>
+          <a:prstGeom prst="bentConnector3">
+            <a:avLst>
+              <a:gd name="adj1" fmla="val 74526"/>
+            </a:avLst>
+          </a:prstGeom>
+          <a:ln>
+            <a:tailEnd type="triangle"/>
+          </a:ln>
+        </p:spPr>
+        <p:style>
+          <a:lnRef idx="1">
+            <a:schemeClr val="accent1"/>
+          </a:lnRef>
+          <a:fillRef idx="0">
+            <a:schemeClr val="accent1"/>
+          </a:fillRef>
+          <a:effectRef idx="0">
+            <a:schemeClr val="accent1"/>
+          </a:effectRef>
+          <a:fontRef idx="minor">
+            <a:schemeClr val="tx1"/>
+          </a:fontRef>
+        </p:style>
+      </p:cxnSp>
+      <p:sp>
+        <p:nvSpPr>
+          <p:cNvPr id="14" name="Rectangle 13">
+            <a:extLst>
+              <a:ext uri="{FF2B5EF4-FFF2-40B4-BE49-F238E27FC236}">
+                <a16:creationId xmlns:a16="http://schemas.microsoft.com/office/drawing/2014/main" id="{948DCA3B-F829-4023-97AD-30B5CC5A841D}"/>
+              </a:ext>
+            </a:extLst>
+          </p:cNvPr>
+          <p:cNvSpPr/>
+          <p:nvPr/>
+        </p:nvSpPr>
+        <p:spPr>
+          <a:xfrm>
+            <a:off x="7246283" y="3046640"/>
+            <a:ext cx="1894114" cy="204537"/>
+          </a:xfrm>
+          <a:prstGeom prst="rect">
+            <a:avLst/>
+          </a:prstGeom>
+          <a:solidFill>
+            <a:srgbClr val="FFC000">
+              <a:alpha val="20000"/>
+            </a:srgbClr>
+          </a:solidFill>
+          <a:ln>
+            <a:solidFill>
+              <a:srgbClr val="FFFF00"/>
+            </a:solidFill>
+          </a:ln>
+        </p:spPr>
+        <p:style>
+          <a:lnRef idx="0">
+            <a:scrgbClr r="0" g="0" b="0"/>
+          </a:lnRef>
+          <a:fillRef idx="0">
+            <a:scrgbClr r="0" g="0" b="0"/>
+          </a:fillRef>
+          <a:effectRef idx="0">
+            <a:scrgbClr r="0" g="0" b="0"/>
+          </a:effectRef>
+          <a:fontRef idx="minor">
+            <a:schemeClr val="lt1"/>
+          </a:fontRef>
+        </p:style>
+        <p:txBody>
+          <a:bodyPr rtlCol="0" anchor="ctr"/>
+          <a:lstStyle/>
+          <a:p>
+            <a:pPr algn="ctr"/>
+            <a:endParaRPr lang="en-US"/>
+          </a:p>
+        </p:txBody>
+      </p:sp>
+      <p:pic>
+        <p:nvPicPr>
+          <p:cNvPr id="17" name="Picture 16">
+            <a:extLst>
+              <a:ext uri="{FF2B5EF4-FFF2-40B4-BE49-F238E27FC236}">
+                <a16:creationId xmlns:a16="http://schemas.microsoft.com/office/drawing/2014/main" id="{79E0D4C6-4160-4E9C-A68A-B66FC0D25C85}"/>
+              </a:ext>
+            </a:extLst>
+          </p:cNvPr>
+          <p:cNvPicPr>
+            <a:picLocks noChangeAspect="1"/>
+          </p:cNvPicPr>
+          <p:nvPr/>
+        </p:nvPicPr>
+        <p:blipFill>
+          <a:blip r:embed="rId4"/>
+          <a:stretch>
+            <a:fillRect/>
+          </a:stretch>
+        </p:blipFill>
+        <p:spPr>
+          <a:xfrm>
+            <a:off x="179920" y="2011240"/>
+            <a:ext cx="5108264" cy="357942"/>
+          </a:xfrm>
+          <a:prstGeom prst="rect">
+            <a:avLst/>
+          </a:prstGeom>
+        </p:spPr>
+      </p:pic>
+      <p:sp>
+        <p:nvSpPr>
+          <p:cNvPr id="18" name="Rectangle 17">
+            <a:extLst>
+              <a:ext uri="{FF2B5EF4-FFF2-40B4-BE49-F238E27FC236}">
+                <a16:creationId xmlns:a16="http://schemas.microsoft.com/office/drawing/2014/main" id="{DD1E9E55-48D4-4488-BE2C-F7539D0B52E6}"/>
+              </a:ext>
+            </a:extLst>
+          </p:cNvPr>
+          <p:cNvSpPr/>
+          <p:nvPr/>
+        </p:nvSpPr>
+        <p:spPr>
+          <a:xfrm>
+            <a:off x="243906" y="4753434"/>
+            <a:ext cx="1894114" cy="169425"/>
+          </a:xfrm>
+          <a:prstGeom prst="rect">
+            <a:avLst/>
+          </a:prstGeom>
+          <a:solidFill>
+            <a:schemeClr val="accent6">
+              <a:lumMod val="75000"/>
+              <a:alpha val="20000"/>
+            </a:schemeClr>
+          </a:solidFill>
+          <a:ln>
+            <a:solidFill>
+              <a:srgbClr val="92D050"/>
+            </a:solidFill>
+          </a:ln>
+        </p:spPr>
+        <p:style>
+          <a:lnRef idx="0">
+            <a:scrgbClr r="0" g="0" b="0"/>
+          </a:lnRef>
+          <a:fillRef idx="0">
+            <a:scrgbClr r="0" g="0" b="0"/>
+          </a:fillRef>
+          <a:effectRef idx="0">
+            <a:scrgbClr r="0" g="0" b="0"/>
+          </a:effectRef>
+          <a:fontRef idx="minor">
+            <a:schemeClr val="lt1"/>
+          </a:fontRef>
+        </p:style>
+        <p:txBody>
+          <a:bodyPr rtlCol="0" anchor="ctr"/>
+          <a:lstStyle/>
+          <a:p>
+            <a:pPr algn="ctr"/>
+            <a:endParaRPr lang="en-US"/>
+          </a:p>
+        </p:txBody>
+      </p:sp>
+      <p:sp>
+        <p:nvSpPr>
+          <p:cNvPr id="19" name="Rectangle 18">
+            <a:extLst>
+              <a:ext uri="{FF2B5EF4-FFF2-40B4-BE49-F238E27FC236}">
+                <a16:creationId xmlns:a16="http://schemas.microsoft.com/office/drawing/2014/main" id="{42E22B79-BA39-4E9D-A7FE-C23B0A8CE4A3}"/>
+              </a:ext>
+            </a:extLst>
+          </p:cNvPr>
+          <p:cNvSpPr/>
+          <p:nvPr/>
+        </p:nvSpPr>
+        <p:spPr>
+          <a:xfrm>
+            <a:off x="7246283" y="3249817"/>
+            <a:ext cx="1894114" cy="169425"/>
+          </a:xfrm>
+          <a:prstGeom prst="rect">
+            <a:avLst/>
+          </a:prstGeom>
+          <a:solidFill>
+            <a:schemeClr val="accent6">
+              <a:lumMod val="75000"/>
+              <a:alpha val="20000"/>
+            </a:schemeClr>
+          </a:solidFill>
+          <a:ln>
+            <a:solidFill>
+              <a:srgbClr val="92D050"/>
+            </a:solidFill>
+          </a:ln>
+        </p:spPr>
+        <p:style>
+          <a:lnRef idx="0">
+            <a:scrgbClr r="0" g="0" b="0"/>
+          </a:lnRef>
+          <a:fillRef idx="0">
+            <a:scrgbClr r="0" g="0" b="0"/>
+          </a:fillRef>
+          <a:effectRef idx="0">
+            <a:scrgbClr r="0" g="0" b="0"/>
+          </a:effectRef>
+          <a:fontRef idx="minor">
+            <a:schemeClr val="lt1"/>
+          </a:fontRef>
+        </p:style>
+        <p:txBody>
+          <a:bodyPr rtlCol="0" anchor="ctr"/>
+          <a:lstStyle/>
+          <a:p>
+            <a:pPr algn="ctr"/>
+            <a:endParaRPr lang="en-US"/>
+          </a:p>
+        </p:txBody>
+      </p:sp>
+      <p:cxnSp>
+        <p:nvCxnSpPr>
+          <p:cNvPr id="20" name="Connector: Elbow 19">
+            <a:extLst>
+              <a:ext uri="{FF2B5EF4-FFF2-40B4-BE49-F238E27FC236}">
+                <a16:creationId xmlns:a16="http://schemas.microsoft.com/office/drawing/2014/main" id="{490171AB-FD70-4690-AF3A-D08A8ADEADEE}"/>
+              </a:ext>
+            </a:extLst>
+          </p:cNvPr>
+          <p:cNvCxnSpPr>
+            <a:cxnSpLocks/>
+            <a:stCxn id="18" idx="3"/>
+            <a:endCxn id="19" idx="1"/>
+          </p:cNvCxnSpPr>
+          <p:nvPr/>
+        </p:nvCxnSpPr>
+        <p:spPr>
+          <a:xfrm flipV="1">
+            <a:off x="2138020" y="3334530"/>
+            <a:ext cx="5108263" cy="1503617"/>
+          </a:xfrm>
+          <a:prstGeom prst="bentConnector3">
+            <a:avLst>
+              <a:gd name="adj1" fmla="val 91264"/>
+            </a:avLst>
+          </a:prstGeom>
+          <a:ln>
+            <a:solidFill>
+              <a:srgbClr val="92D050"/>
+            </a:solidFill>
+            <a:tailEnd type="triangle"/>
+          </a:ln>
+        </p:spPr>
+        <p:style>
+          <a:lnRef idx="1">
+            <a:schemeClr val="accent1"/>
+          </a:lnRef>
+          <a:fillRef idx="0">
+            <a:schemeClr val="accent1"/>
+          </a:fillRef>
+          <a:effectRef idx="0">
+            <a:schemeClr val="accent1"/>
+          </a:effectRef>
+          <a:fontRef idx="minor">
+            <a:schemeClr val="tx1"/>
+          </a:fontRef>
+        </p:style>
+      </p:cxnSp>
+    </p:spTree>
+    <p:extLst>
+      <p:ext uri="{BB962C8B-B14F-4D97-AF65-F5344CB8AC3E}">
+        <p14:creationId xmlns:p14="http://schemas.microsoft.com/office/powerpoint/2010/main" val="4171925615"/>
+      </p:ext>
+    </p:extLst>
+  </p:cSld>
+  <p:clrMapOvr>
+    <a:masterClrMapping/>
+  </p:clrMapOvr>
+</p:sld>
+</file>
+
 <file path=ppt/slides/slide2.xml><?xml version="1.0" encoding="utf-8"?>
 <p:sld xmlns:a="http://schemas.openxmlformats.org/drawingml/2006/main" xmlns:r="http://schemas.openxmlformats.org/officeDocument/2006/relationships" xmlns:p="http://schemas.openxmlformats.org/presentationml/2006/main">
   <p:cSld>
@@ -18685,6 +19363,7 @@
             </a:extLst>
           </p:cNvPr>
           <p:cNvCxnSpPr>
+            <a:cxnSpLocks/>
             <a:stCxn id="15" idx="1"/>
             <a:endCxn id="14" idx="1"/>
           </p:cNvCxnSpPr>

</xml_diff>